<commit_message>
Change minor thing in presentation
</commit_message>
<xml_diff>
--- a/NPJohn.pptx
+++ b/NPJohn.pptx
@@ -109,6 +109,11 @@
       </a:defRPr>
     </a:lvl9pPr>
   </p:defaultTextStyle>
+  <p:extLst>
+    <p:ext uri="{EFAFB233-063F-42B5-8137-9DF3F51BA10A}">
+      <p15:sldGuideLst xmlns:p15="http://schemas.microsoft.com/office/powerpoint/2012/main"/>
+    </p:ext>
+  </p:extLst>
 </p:presentation>
 </file>
 
@@ -5612,12 +5617,9 @@
           <a:p>
             <a:r>
               <a:rPr lang="it-IT" sz="4800" dirty="0" err="1"/>
-              <a:t>Parallel</a:t>
-            </a:r>
-            <a:r>
-              <a:rPr lang="it-IT" sz="4800" dirty="0"/>
-              <a:t> JTR</a:t>
-            </a:r>
+              <a:t>NPJohn</a:t>
+            </a:r>
+            <a:endParaRPr lang="it-IT" sz="4800" dirty="0"/>
           </a:p>
         </p:txBody>
       </p:sp>
@@ -5651,15 +5653,7 @@
           <a:p>
             <a:r>
               <a:rPr lang="it-IT" sz="2000" dirty="0"/>
-              <a:t>Una versione </a:t>
-            </a:r>
-            <a:r>
-              <a:rPr lang="it-IT" sz="2000" dirty="0" err="1"/>
-              <a:t>multicore</a:t>
-            </a:r>
-            <a:r>
-              <a:rPr lang="it-IT" sz="2000" dirty="0"/>
-              <a:t> e distribuita di John the </a:t>
+              <a:t>Una versione parallela e distribuita di John the </a:t>
             </a:r>
             <a:r>
               <a:rPr lang="it-IT" sz="2000" dirty="0" err="1"/>

</xml_diff>